<commit_message>
working on intro and discussion notes
</commit_message>
<xml_diff>
--- a/docs/manuscripts/euc manuscript/figs/euc_MS_figure_panels_JL_17-07-17.pptx
+++ b/docs/manuscripts/euc manuscript/figs/euc_MS_figure_panels_JL_17-07-17.pptx
@@ -203,7 +203,7 @@
           <a:p>
             <a:fld id="{36C24D47-6580-4785-9462-CADD8599AFB8}" type="datetimeFigureOut">
               <a:rPr lang="en-AU" smtClean="0"/>
-              <a:t>17/07/2017</a:t>
+              <a:t>25/07/2017</a:t>
             </a:fld>
             <a:endParaRPr lang="en-AU"/>
           </a:p>
@@ -732,15 +732,7 @@
             </a:pPr>
             <a:r>
               <a:rPr lang="en-AU" dirty="0" smtClean="0"/>
-              <a:t>a.) We used a hierarchical protein functional annotation system (MAPMAN/Mercator, ref) to assign proteins to functional groupings. Here we show </a:t>
-            </a:r>
-            <a:r>
-              <a:rPr lang="en-AU" dirty="0" smtClean="0"/>
-              <a:t>average </a:t>
-            </a:r>
-            <a:r>
-              <a:rPr lang="en-AU" dirty="0" smtClean="0"/>
-              <a:t>abundances of proteins associated with all major functional groupings in eucalypt leaves (left) and within photosynthesis (right); angular fraction indicates the proportion of protein associated with a named functional category. % values represent</a:t>
+              <a:t>a.) We used a hierarchical protein functional annotation system (MAPMAN/Mercator, ref) to assign proteins to functional groupings. Here we show average abundances of proteins associated with all major functional groupings in eucalypt leaves (left) and within photosynthesis (right); angular fraction indicates the proportion of protein associated with a named functional category. % values represent</a:t>
             </a:r>
             <a:r>
               <a:rPr lang="en-AU" baseline="0" dirty="0" smtClean="0"/>
@@ -928,19 +920,7 @@
                 <a:ea typeface="+mn-ea"/>
                 <a:cs typeface="+mn-cs"/>
               </a:rPr>
-              <a:t>a</a:t>
-            </a:r>
-            <a:r>
-              <a:rPr lang="en-AU" sz="1680" kern="1200" dirty="0" smtClean="0">
-                <a:solidFill>
-                  <a:schemeClr val="tx1"/>
-                </a:solidFill>
-                <a:effectLst/>
-                <a:latin typeface="+mn-lt"/>
-                <a:ea typeface="+mn-ea"/>
-                <a:cs typeface="+mn-cs"/>
-              </a:rPr>
-              <a:t>.)</a:t>
+              <a:t>a.)</a:t>
             </a:r>
             <a:r>
               <a:rPr lang="en-AU" sz="1680" kern="1200" baseline="0" dirty="0" smtClean="0">
@@ -964,31 +944,7 @@
                 <a:ea typeface="+mn-ea"/>
                 <a:cs typeface="+mn-cs"/>
               </a:rPr>
-              <a:t>Correlations </a:t>
-            </a:r>
-            <a:r>
-              <a:rPr lang="en-AU" sz="1680" kern="1200" dirty="0" smtClean="0">
-                <a:solidFill>
-                  <a:schemeClr val="tx1"/>
-                </a:solidFill>
-                <a:effectLst/>
-                <a:latin typeface="+mn-lt"/>
-                <a:ea typeface="+mn-ea"/>
-                <a:cs typeface="+mn-cs"/>
-              </a:rPr>
-              <a:t>between environmental variables, </a:t>
-            </a:r>
-            <a:r>
-              <a:rPr lang="en-AU" sz="1680" kern="1200" dirty="0" smtClean="0">
-                <a:solidFill>
-                  <a:schemeClr val="tx1"/>
-                </a:solidFill>
-                <a:effectLst/>
-                <a:latin typeface="+mn-lt"/>
-                <a:ea typeface="+mn-ea"/>
-                <a:cs typeface="+mn-cs"/>
-              </a:rPr>
-              <a:t>leaf functional traits</a:t>
+              <a:t>Correlations between environmental variables, leaf functional traits</a:t>
             </a:r>
             <a:r>
               <a:rPr lang="en-AU" sz="1680" kern="1200" baseline="0" dirty="0" smtClean="0">
@@ -1012,31 +968,7 @@
                 <a:ea typeface="+mn-ea"/>
                 <a:cs typeface="+mn-cs"/>
               </a:rPr>
-              <a:t>and </a:t>
-            </a:r>
-            <a:r>
-              <a:rPr lang="en-AU" sz="1680" kern="1200" dirty="0" smtClean="0">
-                <a:solidFill>
-                  <a:schemeClr val="tx1"/>
-                </a:solidFill>
-                <a:effectLst/>
-                <a:latin typeface="+mn-lt"/>
-                <a:ea typeface="+mn-ea"/>
-                <a:cs typeface="+mn-cs"/>
-              </a:rPr>
-              <a:t>major protein functional categories. </a:t>
-            </a:r>
-            <a:r>
-              <a:rPr lang="en-AU" sz="1680" kern="1200" dirty="0" smtClean="0">
-                <a:solidFill>
-                  <a:schemeClr val="tx1"/>
-                </a:solidFill>
-                <a:effectLst/>
-                <a:latin typeface="+mn-lt"/>
-                <a:ea typeface="+mn-ea"/>
-                <a:cs typeface="+mn-cs"/>
-              </a:rPr>
-              <a:t>Pairwise</a:t>
+              <a:t>and major protein functional categories. Pairwise</a:t>
             </a:r>
             <a:r>
               <a:rPr lang="en-AU" sz="1680" kern="1200" baseline="0" dirty="0" smtClean="0">
@@ -1060,19 +992,7 @@
                 <a:ea typeface="+mn-ea"/>
                 <a:cs typeface="+mn-cs"/>
               </a:rPr>
-              <a:t>Pearson correlations </a:t>
-            </a:r>
-            <a:r>
-              <a:rPr lang="en-AU" sz="1680" kern="1200" dirty="0" smtClean="0">
-                <a:solidFill>
-                  <a:schemeClr val="tx1"/>
-                </a:solidFill>
-                <a:effectLst/>
-                <a:latin typeface="+mn-lt"/>
-                <a:ea typeface="+mn-ea"/>
-                <a:cs typeface="+mn-cs"/>
-              </a:rPr>
-              <a:t>between pairs of variables are represented by coloured tiles where p &lt; 0.05. Protein abundances on a per leaf area basis (mg protein / m2 leaf area) are used to calculate correlations presented in the bottom/right diagonal and proportional protein abundances (i.e. fraction of total leaf protein abundance) are used to calculate correlations presented in the top/left diagonal.</a:t>
+              <a:t>Pearson correlations between pairs of variables are represented by coloured tiles where p &lt; 0.05. Protein abundances on a per leaf area basis (mg protein / m2 leaf area) are used to calculate correlations presented in the bottom/right diagonal and proportional protein abundances (i.e. fraction of total leaf protein abundance) are used to calculate correlations presented in the top/left diagonal.</a:t>
             </a:r>
           </a:p>
           <a:p>
@@ -1114,43 +1034,7 @@
                 <a:ea typeface="+mn-ea"/>
                 <a:cs typeface="+mn-cs"/>
               </a:rPr>
-              <a:t>b.) </a:t>
-            </a:r>
-            <a:r>
-              <a:rPr lang="en-AU" sz="1680" kern="1200" dirty="0" smtClean="0">
-                <a:solidFill>
-                  <a:schemeClr val="tx1"/>
-                </a:solidFill>
-                <a:effectLst/>
-                <a:latin typeface="+mn-lt"/>
-                <a:ea typeface="+mn-ea"/>
-                <a:cs typeface="+mn-cs"/>
-              </a:rPr>
-              <a:t>Trends </a:t>
-            </a:r>
-            <a:r>
-              <a:rPr lang="en-AU" sz="1680" kern="1200" dirty="0" smtClean="0">
-                <a:solidFill>
-                  <a:schemeClr val="tx1"/>
-                </a:solidFill>
-                <a:effectLst/>
-                <a:latin typeface="+mn-lt"/>
-                <a:ea typeface="+mn-ea"/>
-                <a:cs typeface="+mn-cs"/>
-              </a:rPr>
-              <a:t>in abundance of photosystem proteins [symbol, colour] and Calvin cycle enzymes [symbol, colour] are shown across gradients </a:t>
-            </a:r>
-            <a:r>
-              <a:rPr lang="en-AU" sz="1680" kern="1200" dirty="0" smtClean="0">
-                <a:solidFill>
-                  <a:schemeClr val="tx1"/>
-                </a:solidFill>
-                <a:effectLst/>
-                <a:latin typeface="+mn-lt"/>
-                <a:ea typeface="+mn-ea"/>
-                <a:cs typeface="+mn-cs"/>
-              </a:rPr>
-              <a:t>of: </a:t>
+              <a:t>b.) Trends in abundance of photosystem proteins [symbol, colour] and Calvin cycle enzymes [symbol, colour] are shown across gradients of: </a:t>
             </a:r>
             <a:r>
               <a:rPr lang="en-AU" sz="1680" kern="1200" dirty="0" err="1" smtClean="0">
@@ -1270,31 +1154,7 @@
                 <a:ea typeface="+mn-ea"/>
                 <a:cs typeface="+mn-cs"/>
               </a:rPr>
-              <a:t>Points </a:t>
-            </a:r>
-            <a:r>
-              <a:rPr lang="en-AU" sz="1680" kern="1200" dirty="0" smtClean="0">
-                <a:solidFill>
-                  <a:schemeClr val="tx1"/>
-                </a:solidFill>
-                <a:effectLst/>
-                <a:latin typeface="+mn-lt"/>
-                <a:ea typeface="+mn-ea"/>
-                <a:cs typeface="+mn-cs"/>
-              </a:rPr>
-              <a:t>represent the average protein abundance for individual species * site combinations (n = 9, 3 leaves from each of 3 individuals). </a:t>
-            </a:r>
-            <a:r>
-              <a:rPr lang="en-AU" sz="1680" kern="1200" dirty="0" smtClean="0">
-                <a:solidFill>
-                  <a:schemeClr val="tx1"/>
-                </a:solidFill>
-                <a:effectLst/>
-                <a:latin typeface="+mn-lt"/>
-                <a:ea typeface="+mn-ea"/>
-                <a:cs typeface="+mn-cs"/>
-              </a:rPr>
-              <a:t>SEM (standard</a:t>
+              <a:t>Points represent the average protein abundance for individual species * site combinations (n = 9, 3 leaves from each of 3 individuals). SEM (standard</a:t>
             </a:r>
             <a:r>
               <a:rPr lang="en-AU" sz="1680" kern="1200" baseline="0" dirty="0" smtClean="0">
@@ -1318,31 +1178,7 @@
                 <a:ea typeface="+mn-ea"/>
                 <a:cs typeface="+mn-cs"/>
               </a:rPr>
-              <a:t> </a:t>
-            </a:r>
-            <a:r>
-              <a:rPr lang="en-AU" sz="1680" kern="1200" dirty="0" smtClean="0">
-                <a:solidFill>
-                  <a:schemeClr val="tx1"/>
-                </a:solidFill>
-                <a:effectLst/>
-                <a:latin typeface="+mn-lt"/>
-                <a:ea typeface="+mn-ea"/>
-                <a:cs typeface="+mn-cs"/>
-              </a:rPr>
-              <a:t>error bars are presented for protein abundances </a:t>
-            </a:r>
-            <a:r>
-              <a:rPr lang="en-AU" sz="1680" kern="1200" dirty="0" smtClean="0">
-                <a:solidFill>
-                  <a:schemeClr val="tx1"/>
-                </a:solidFill>
-                <a:effectLst/>
-                <a:latin typeface="+mn-lt"/>
-                <a:ea typeface="+mn-ea"/>
-                <a:cs typeface="+mn-cs"/>
-              </a:rPr>
-              <a:t>(y-axis)</a:t>
+              <a:t> error bars are presented for protein abundances (y-axis)</a:t>
             </a:r>
             <a:r>
               <a:rPr lang="en-AU" sz="1680" kern="1200" baseline="0" dirty="0" smtClean="0">
@@ -1366,79 +1202,7 @@
                 <a:ea typeface="+mn-ea"/>
                 <a:cs typeface="+mn-cs"/>
               </a:rPr>
-              <a:t>and </a:t>
-            </a:r>
-            <a:r>
-              <a:rPr lang="en-AU" sz="1680" kern="1200" dirty="0" smtClean="0">
-                <a:solidFill>
-                  <a:schemeClr val="tx1"/>
-                </a:solidFill>
-                <a:effectLst/>
-                <a:latin typeface="+mn-lt"/>
-                <a:ea typeface="+mn-ea"/>
-                <a:cs typeface="+mn-cs"/>
-              </a:rPr>
-              <a:t>for canopy-corrected </a:t>
-            </a:r>
-            <a:r>
-              <a:rPr lang="en-AU" sz="1680" kern="1200" dirty="0" smtClean="0">
-                <a:solidFill>
-                  <a:schemeClr val="tx1"/>
-                </a:solidFill>
-                <a:effectLst/>
-                <a:latin typeface="+mn-lt"/>
-                <a:ea typeface="+mn-ea"/>
-                <a:cs typeface="+mn-cs"/>
-              </a:rPr>
-              <a:t>irradiances (x-axis) (mean </a:t>
-            </a:r>
-            <a:r>
-              <a:rPr lang="en-AU" sz="1680" kern="1200" dirty="0" smtClean="0">
-                <a:solidFill>
-                  <a:schemeClr val="tx1"/>
-                </a:solidFill>
-                <a:effectLst/>
-                <a:latin typeface="+mn-lt"/>
-                <a:ea typeface="+mn-ea"/>
-                <a:cs typeface="+mn-cs"/>
-              </a:rPr>
-              <a:t>canopy openness values are derived from measurements of three </a:t>
-            </a:r>
-            <a:r>
-              <a:rPr lang="en-AU" sz="1680" kern="1200" dirty="0" smtClean="0">
-                <a:solidFill>
-                  <a:schemeClr val="tx1"/>
-                </a:solidFill>
-                <a:effectLst/>
-                <a:latin typeface="+mn-lt"/>
-                <a:ea typeface="+mn-ea"/>
-                <a:cs typeface="+mn-cs"/>
-              </a:rPr>
-              <a:t>individuals). </a:t>
-            </a:r>
-            <a:r>
-              <a:rPr lang="en-AU" sz="1680" kern="1200" dirty="0" smtClean="0">
-                <a:solidFill>
-                  <a:schemeClr val="tx1"/>
-                </a:solidFill>
-                <a:effectLst/>
-                <a:latin typeface="+mn-lt"/>
-                <a:ea typeface="+mn-ea"/>
-                <a:cs typeface="+mn-cs"/>
-              </a:rPr>
-              <a:t>Model fits (OLS regression) are shown where p &lt; 0.05</a:t>
-            </a:r>
-            <a:r>
-              <a:rPr lang="en-AU" sz="1680" kern="1200" dirty="0" smtClean="0">
-                <a:solidFill>
-                  <a:schemeClr val="tx1"/>
-                </a:solidFill>
-                <a:effectLst/>
-                <a:latin typeface="+mn-lt"/>
-                <a:ea typeface="+mn-ea"/>
-                <a:cs typeface="+mn-cs"/>
-              </a:rPr>
-              <a:t>.</a:t>
+              <a:t>and for canopy-corrected irradiances (x-axis) (mean canopy openness values are derived from measurements of three individuals). Model fits (OLS regression) are shown where p &lt; 0.05.</a:t>
             </a:r>
           </a:p>
           <a:p>
@@ -1480,19 +1244,7 @@
                 <a:ea typeface="+mn-ea"/>
                 <a:cs typeface="+mn-cs"/>
               </a:rPr>
-              <a:t>The top row of the lower panel </a:t>
-            </a:r>
-            <a:r>
-              <a:rPr lang="en-AU" sz="1680" kern="1200" dirty="0" smtClean="0">
-                <a:solidFill>
-                  <a:schemeClr val="tx1"/>
-                </a:solidFill>
-                <a:effectLst/>
-                <a:latin typeface="+mn-lt"/>
-                <a:ea typeface="+mn-ea"/>
-                <a:cs typeface="+mn-cs"/>
-              </a:rPr>
-              <a:t>(</a:t>
+              <a:t>The top row of the lower panel (</a:t>
             </a:r>
             <a:r>
               <a:rPr lang="en-AU" sz="1680" kern="1200" dirty="0" err="1" smtClean="0">
@@ -1516,79 +1268,7 @@
                 <a:ea typeface="+mn-ea"/>
                 <a:cs typeface="+mn-cs"/>
               </a:rPr>
-              <a:t>, iii, v) </a:t>
-            </a:r>
-            <a:r>
-              <a:rPr lang="en-AU" sz="1680" kern="1200" dirty="0" smtClean="0">
-                <a:solidFill>
-                  <a:schemeClr val="tx1"/>
-                </a:solidFill>
-                <a:effectLst/>
-                <a:latin typeface="+mn-lt"/>
-                <a:ea typeface="+mn-ea"/>
-                <a:cs typeface="+mn-cs"/>
-              </a:rPr>
-              <a:t>shows models fit using protein abundances expressed on a </a:t>
-            </a:r>
-            <a:r>
-              <a:rPr lang="en-AU" sz="1680" kern="1200" dirty="0" smtClean="0">
-                <a:solidFill>
-                  <a:schemeClr val="tx1"/>
-                </a:solidFill>
-                <a:effectLst/>
-                <a:latin typeface="+mn-lt"/>
-                <a:ea typeface="+mn-ea"/>
-                <a:cs typeface="+mn-cs"/>
-              </a:rPr>
-              <a:t>per leaf area basis (mg protein / m2 leaf area); </a:t>
-            </a:r>
-            <a:r>
-              <a:rPr lang="en-AU" sz="1680" kern="1200" dirty="0" smtClean="0">
-                <a:solidFill>
-                  <a:schemeClr val="tx1"/>
-                </a:solidFill>
-                <a:effectLst/>
-                <a:latin typeface="+mn-lt"/>
-                <a:ea typeface="+mn-ea"/>
-                <a:cs typeface="+mn-cs"/>
-              </a:rPr>
-              <a:t>the bottom row </a:t>
-            </a:r>
-            <a:r>
-              <a:rPr lang="en-AU" sz="1680" kern="1200" dirty="0" smtClean="0">
-                <a:solidFill>
-                  <a:schemeClr val="tx1"/>
-                </a:solidFill>
-                <a:effectLst/>
-                <a:latin typeface="+mn-lt"/>
-                <a:ea typeface="+mn-ea"/>
-                <a:cs typeface="+mn-cs"/>
-              </a:rPr>
-              <a:t>(ii, iv, vi,) </a:t>
-            </a:r>
-            <a:r>
-              <a:rPr lang="en-AU" sz="1680" kern="1200" dirty="0" smtClean="0">
-                <a:solidFill>
-                  <a:schemeClr val="tx1"/>
-                </a:solidFill>
-                <a:effectLst/>
-                <a:latin typeface="+mn-lt"/>
-                <a:ea typeface="+mn-ea"/>
-                <a:cs typeface="+mn-cs"/>
-              </a:rPr>
-              <a:t>shows models fit using protein abundances expressed on </a:t>
-            </a:r>
-            <a:r>
-              <a:rPr lang="en-AU" sz="1680" kern="1200" dirty="0" smtClean="0">
-                <a:solidFill>
-                  <a:schemeClr val="tx1"/>
-                </a:solidFill>
-                <a:effectLst/>
-                <a:latin typeface="+mn-lt"/>
-                <a:ea typeface="+mn-ea"/>
-                <a:cs typeface="+mn-cs"/>
-              </a:rPr>
-              <a:t>a fractional basis (i.e. as a fraction</a:t>
+              <a:t>, iii, v) shows models fit using protein abundances expressed on a per leaf area basis (mg protein / m2 leaf area); the bottom row (ii, iv, vi,) shows models fit using protein abundances expressed on a fractional basis (i.e. as a fraction</a:t>
             </a:r>
             <a:r>
               <a:rPr lang="en-AU" sz="1680" kern="1200" baseline="0" dirty="0" smtClean="0">
@@ -1614,6 +1294,8 @@
               </a:rPr>
               <a:t>. </a:t>
             </a:r>
+          </a:p>
+          <a:p>
             <a:endParaRPr lang="en-AU" sz="1680" kern="1200" dirty="0" smtClean="0">
               <a:solidFill>
                 <a:schemeClr val="tx1"/>
@@ -1625,6 +1307,20 @@
             </a:endParaRPr>
           </a:p>
           <a:p>
+            <a:r>
+              <a:rPr lang="en-AU" sz="1680" kern="1200" dirty="0" smtClean="0">
+                <a:solidFill>
+                  <a:schemeClr val="tx1"/>
+                </a:solidFill>
+                <a:effectLst/>
+                <a:latin typeface="+mn-lt"/>
+                <a:ea typeface="+mn-ea"/>
+                <a:cs typeface="+mn-cs"/>
+              </a:rPr>
+              <a:t>c.) Influence of leaf traits on photosynthetic protein abundance: </a:t>
+            </a:r>
+          </a:p>
+          <a:p>
             <a:endParaRPr lang="en-AU" sz="1680" kern="1200" dirty="0" smtClean="0">
               <a:solidFill>
                 <a:schemeClr val="tx1"/>
@@ -1637,7 +1333,7 @@
           </a:p>
           <a:p>
             <a:r>
-              <a:rPr lang="en-AU" sz="1680" kern="1200" dirty="0" smtClean="0">
+              <a:rPr lang="en-AU" sz="1680" kern="1200" dirty="0" err="1" smtClean="0">
                 <a:solidFill>
                   <a:schemeClr val="tx1"/>
                 </a:solidFill>
@@ -1646,7 +1342,19 @@
                 <a:ea typeface="+mn-ea"/>
                 <a:cs typeface="+mn-cs"/>
               </a:rPr>
-              <a:t>c.) Influence of leaf traits on photosynthetic protein abundance: </a:t>
+              <a:t>i</a:t>
+            </a:r>
+            <a:r>
+              <a:rPr lang="en-AU" sz="1680" kern="1200" dirty="0" smtClean="0">
+                <a:solidFill>
+                  <a:schemeClr val="tx1"/>
+                </a:solidFill>
+                <a:effectLst/>
+                <a:latin typeface="+mn-lt"/>
+                <a:ea typeface="+mn-ea"/>
+                <a:cs typeface="+mn-cs"/>
+              </a:rPr>
+              <a:t>.) Neither photosystems nor Calvin cycle enzymes change proportionally in response to total leaf protein, p = , R2 = ; ii.) on a per leaf area basis, abundances of both functional categories strongly track leaf total protein, although there is more variation associated with photosystem protein abundances than Calvin cycle protein abundances. iii.) Proportional abundance of photosystem proteins declines as leaf mass per area (LMA, g/m2) increases (R2 = , p = ), but no such trend is apparent for Calvin cycle proteins (p = , R2 = ); iv.) On a per leaf area basis, abundance of Calvin cycle proteins increases with LMA (R2 =, p  = ), while photosystem protein abundance does not change (R2 = , p = ). </a:t>
             </a:r>
           </a:p>
           <a:p>
@@ -1662,43 +1370,6 @@
           </a:p>
           <a:p>
             <a:r>
-              <a:rPr lang="en-AU" sz="1680" kern="1200" dirty="0" err="1" smtClean="0">
-                <a:solidFill>
-                  <a:schemeClr val="tx1"/>
-                </a:solidFill>
-                <a:effectLst/>
-                <a:latin typeface="+mn-lt"/>
-                <a:ea typeface="+mn-ea"/>
-                <a:cs typeface="+mn-cs"/>
-              </a:rPr>
-              <a:t>i</a:t>
-            </a:r>
-            <a:r>
-              <a:rPr lang="en-AU" sz="1680" kern="1200" dirty="0" smtClean="0">
-                <a:solidFill>
-                  <a:schemeClr val="tx1"/>
-                </a:solidFill>
-                <a:effectLst/>
-                <a:latin typeface="+mn-lt"/>
-                <a:ea typeface="+mn-ea"/>
-                <a:cs typeface="+mn-cs"/>
-              </a:rPr>
-              <a:t>.) Neither photosystems nor Calvin cycle enzymes change proportionally in response to total leaf protein, p = , R2 = ; ii.) on a per leaf area basis, abundances of both functional categories strongly track leaf total protein, although there is more variation associated with photosystem protein abundances than Calvin cycle protein abundances. iii.) Proportional abundance of photosystem proteins declines as leaf mass per area (LMA, g/m2) increases (R2 = , p = ), but no such trend is apparent for Calvin cycle proteins (p = , R2 = ); iv.) On a per leaf area basis, abundance of Calvin cycle proteins increases with LMA (R2 =, p  = ), while photosystem protein abundance does not change (R2 = , p = ). </a:t>
-            </a:r>
-          </a:p>
-          <a:p>
-            <a:endParaRPr lang="en-AU" sz="1680" kern="1200" dirty="0" smtClean="0">
-              <a:solidFill>
-                <a:schemeClr val="tx1"/>
-              </a:solidFill>
-              <a:effectLst/>
-              <a:latin typeface="+mn-lt"/>
-              <a:ea typeface="+mn-ea"/>
-              <a:cs typeface="+mn-cs"/>
-            </a:endParaRPr>
-          </a:p>
-          <a:p>
-            <a:r>
               <a:rPr lang="en-AU" sz="1680" kern="1200" dirty="0" smtClean="0">
                 <a:solidFill>
                   <a:schemeClr val="tx1"/>
@@ -2095,79 +1766,7 @@
                 <a:ea typeface="+mn-ea"/>
                 <a:cs typeface="+mn-cs"/>
               </a:rPr>
-              <a:t>Multiple </a:t>
-            </a:r>
-            <a:r>
-              <a:rPr lang="en-AU" sz="1680" kern="1200" dirty="0" smtClean="0">
-                <a:solidFill>
-                  <a:schemeClr val="tx1"/>
-                </a:solidFill>
-                <a:effectLst/>
-                <a:latin typeface="+mn-lt"/>
-                <a:ea typeface="+mn-ea"/>
-                <a:cs typeface="+mn-cs"/>
-              </a:rPr>
-              <a:t>regression models </a:t>
-            </a:r>
-            <a:r>
-              <a:rPr lang="en-AU" sz="1680" kern="1200" dirty="0" smtClean="0">
-                <a:solidFill>
-                  <a:schemeClr val="tx1"/>
-                </a:solidFill>
-                <a:effectLst/>
-                <a:latin typeface="+mn-lt"/>
-                <a:ea typeface="+mn-ea"/>
-                <a:cs typeface="+mn-cs"/>
-              </a:rPr>
-              <a:t>are visualised </a:t>
-            </a:r>
-            <a:r>
-              <a:rPr lang="en-AU" sz="1680" kern="1200" dirty="0" smtClean="0">
-                <a:solidFill>
-                  <a:schemeClr val="tx1"/>
-                </a:solidFill>
-                <a:effectLst/>
-                <a:latin typeface="+mn-lt"/>
-                <a:ea typeface="+mn-ea"/>
-                <a:cs typeface="+mn-cs"/>
-              </a:rPr>
-              <a:t>using </a:t>
-            </a:r>
-            <a:r>
-              <a:rPr lang="en-AU" sz="1680" kern="1200" dirty="0" smtClean="0">
-                <a:solidFill>
-                  <a:schemeClr val="tx1"/>
-                </a:solidFill>
-                <a:effectLst/>
-                <a:latin typeface="+mn-lt"/>
-                <a:ea typeface="+mn-ea"/>
-                <a:cs typeface="+mn-cs"/>
-              </a:rPr>
-              <a:t>colouration </a:t>
-            </a:r>
-            <a:r>
-              <a:rPr lang="en-AU" sz="1680" kern="1200" dirty="0" smtClean="0">
-                <a:solidFill>
-                  <a:schemeClr val="tx1"/>
-                </a:solidFill>
-                <a:effectLst/>
-                <a:latin typeface="+mn-lt"/>
-                <a:ea typeface="+mn-ea"/>
-                <a:cs typeface="+mn-cs"/>
-              </a:rPr>
-              <a:t>to indicate the modelled magnitude of protein abundance in two-dimensional environmental space. Curved contours indicate significant interaction effects between predictors. A full table of multiple regression statistics </a:t>
-            </a:r>
-            <a:r>
-              <a:rPr lang="en-AU" sz="1680" kern="1200" dirty="0" smtClean="0">
-                <a:solidFill>
-                  <a:schemeClr val="tx1"/>
-                </a:solidFill>
-                <a:effectLst/>
-                <a:latin typeface="+mn-lt"/>
-                <a:ea typeface="+mn-ea"/>
-                <a:cs typeface="+mn-cs"/>
-              </a:rPr>
-              <a:t>associated with </a:t>
+              <a:t>Multiple regression models are visualised using colouration to indicate the modelled magnitude of protein abundance in two-dimensional environmental space. Curved contours indicate significant interaction effects between predictors. A full table of multiple regression statistics associated with </a:t>
             </a:r>
             <a:r>
               <a:rPr lang="en-AU" sz="1680" kern="1200" dirty="0" err="1" smtClean="0">
@@ -2191,19 +1790,7 @@
                 <a:ea typeface="+mn-ea"/>
                 <a:cs typeface="+mn-cs"/>
               </a:rPr>
-              <a:t> is </a:t>
-            </a:r>
-            <a:r>
-              <a:rPr lang="en-AU" sz="1680" kern="1200" dirty="0" smtClean="0">
-                <a:solidFill>
-                  <a:schemeClr val="tx1"/>
-                </a:solidFill>
-                <a:effectLst/>
-                <a:latin typeface="+mn-lt"/>
-                <a:ea typeface="+mn-ea"/>
-                <a:cs typeface="+mn-cs"/>
-              </a:rPr>
-              <a:t>presented in the supplementary materials.</a:t>
+              <a:t> is presented in the supplementary materials.</a:t>
             </a:r>
           </a:p>
           <a:p>
@@ -2397,7 +1984,7 @@
           <a:p>
             <a:fld id="{DBF67EF4-3E3F-41D9-AB59-178FFA85FB21}" type="datetimeFigureOut">
               <a:rPr lang="en-AU" smtClean="0"/>
-              <a:t>17/07/2017</a:t>
+              <a:t>25/07/2017</a:t>
             </a:fld>
             <a:endParaRPr lang="en-AU"/>
           </a:p>
@@ -2567,7 +2154,7 @@
           <a:p>
             <a:fld id="{DBF67EF4-3E3F-41D9-AB59-178FFA85FB21}" type="datetimeFigureOut">
               <a:rPr lang="en-AU" smtClean="0"/>
-              <a:t>17/07/2017</a:t>
+              <a:t>25/07/2017</a:t>
             </a:fld>
             <a:endParaRPr lang="en-AU"/>
           </a:p>
@@ -2747,7 +2334,7 @@
           <a:p>
             <a:fld id="{DBF67EF4-3E3F-41D9-AB59-178FFA85FB21}" type="datetimeFigureOut">
               <a:rPr lang="en-AU" smtClean="0"/>
-              <a:t>17/07/2017</a:t>
+              <a:t>25/07/2017</a:t>
             </a:fld>
             <a:endParaRPr lang="en-AU"/>
           </a:p>
@@ -2917,7 +2504,7 @@
           <a:p>
             <a:fld id="{DBF67EF4-3E3F-41D9-AB59-178FFA85FB21}" type="datetimeFigureOut">
               <a:rPr lang="en-AU" smtClean="0"/>
-              <a:t>17/07/2017</a:t>
+              <a:t>25/07/2017</a:t>
             </a:fld>
             <a:endParaRPr lang="en-AU"/>
           </a:p>
@@ -3161,7 +2748,7 @@
           <a:p>
             <a:fld id="{DBF67EF4-3E3F-41D9-AB59-178FFA85FB21}" type="datetimeFigureOut">
               <a:rPr lang="en-AU" smtClean="0"/>
-              <a:t>17/07/2017</a:t>
+              <a:t>25/07/2017</a:t>
             </a:fld>
             <a:endParaRPr lang="en-AU"/>
           </a:p>
@@ -3393,7 +2980,7 @@
           <a:p>
             <a:fld id="{DBF67EF4-3E3F-41D9-AB59-178FFA85FB21}" type="datetimeFigureOut">
               <a:rPr lang="en-AU" smtClean="0"/>
-              <a:t>17/07/2017</a:t>
+              <a:t>25/07/2017</a:t>
             </a:fld>
             <a:endParaRPr lang="en-AU"/>
           </a:p>
@@ -3760,7 +3347,7 @@
           <a:p>
             <a:fld id="{DBF67EF4-3E3F-41D9-AB59-178FFA85FB21}" type="datetimeFigureOut">
               <a:rPr lang="en-AU" smtClean="0"/>
-              <a:t>17/07/2017</a:t>
+              <a:t>25/07/2017</a:t>
             </a:fld>
             <a:endParaRPr lang="en-AU"/>
           </a:p>
@@ -3878,7 +3465,7 @@
           <a:p>
             <a:fld id="{DBF67EF4-3E3F-41D9-AB59-178FFA85FB21}" type="datetimeFigureOut">
               <a:rPr lang="en-AU" smtClean="0"/>
-              <a:t>17/07/2017</a:t>
+              <a:t>25/07/2017</a:t>
             </a:fld>
             <a:endParaRPr lang="en-AU"/>
           </a:p>
@@ -3973,7 +3560,7 @@
           <a:p>
             <a:fld id="{DBF67EF4-3E3F-41D9-AB59-178FFA85FB21}" type="datetimeFigureOut">
               <a:rPr lang="en-AU" smtClean="0"/>
-              <a:t>17/07/2017</a:t>
+              <a:t>25/07/2017</a:t>
             </a:fld>
             <a:endParaRPr lang="en-AU"/>
           </a:p>
@@ -4250,7 +3837,7 @@
           <a:p>
             <a:fld id="{DBF67EF4-3E3F-41D9-AB59-178FFA85FB21}" type="datetimeFigureOut">
               <a:rPr lang="en-AU" smtClean="0"/>
-              <a:t>17/07/2017</a:t>
+              <a:t>25/07/2017</a:t>
             </a:fld>
             <a:endParaRPr lang="en-AU"/>
           </a:p>
@@ -4507,7 +4094,7 @@
           <a:p>
             <a:fld id="{DBF67EF4-3E3F-41D9-AB59-178FFA85FB21}" type="datetimeFigureOut">
               <a:rPr lang="en-AU" smtClean="0"/>
-              <a:t>17/07/2017</a:t>
+              <a:t>25/07/2017</a:t>
             </a:fld>
             <a:endParaRPr lang="en-AU"/>
           </a:p>
@@ -4720,7 +4307,7 @@
           <a:p>
             <a:fld id="{DBF67EF4-3E3F-41D9-AB59-178FFA85FB21}" type="datetimeFigureOut">
               <a:rPr lang="en-AU" smtClean="0"/>
-              <a:t>17/07/2017</a:t>
+              <a:t>25/07/2017</a:t>
             </a:fld>
             <a:endParaRPr lang="en-AU"/>
           </a:p>
@@ -5154,7 +4741,7 @@
           <p:cNvPr id="20" name="TextBox 19">
             <a:extLst>
               <a:ext uri="{FF2B5EF4-FFF2-40B4-BE49-F238E27FC236}">
-                <a16:creationId xmlns="" xmlns:a16="http://schemas.microsoft.com/office/drawing/2014/main" id="{036694F8-822A-4EA9-A83F-BB11CF14A3AC}"/>
+                <a16:creationId xmlns:a16="http://schemas.microsoft.com/office/drawing/2014/main" xmlns="" id="{036694F8-822A-4EA9-A83F-BB11CF14A3AC}"/>
               </a:ext>
             </a:extLst>
           </p:cNvPr>
@@ -5509,7 +5096,7 @@
           <p:cNvPr id="13" name="Group 12">
             <a:extLst>
               <a:ext uri="{FF2B5EF4-FFF2-40B4-BE49-F238E27FC236}">
-                <a16:creationId xmlns="" xmlns:a16="http://schemas.microsoft.com/office/drawing/2014/main" id="{C9FFF9FF-C604-459E-BA51-CAAD744824C9}"/>
+                <a16:creationId xmlns:a16="http://schemas.microsoft.com/office/drawing/2014/main" xmlns="" id="{C9FFF9FF-C604-459E-BA51-CAAD744824C9}"/>
               </a:ext>
             </a:extLst>
           </p:cNvPr>
@@ -5529,7 +5116,7 @@
             <p:cNvPr id="14" name="Picture 13" descr="abundance_rank_90pc.png">
               <a:extLst>
                 <a:ext uri="{FF2B5EF4-FFF2-40B4-BE49-F238E27FC236}">
-                  <a16:creationId xmlns="" xmlns:a16="http://schemas.microsoft.com/office/drawing/2014/main" id="{34BBFF6D-3CCF-4CB2-B743-963595FCD805}"/>
+                  <a16:creationId xmlns:a16="http://schemas.microsoft.com/office/drawing/2014/main" xmlns="" id="{34BBFF6D-3CCF-4CB2-B743-963595FCD805}"/>
                 </a:ext>
               </a:extLst>
             </p:cNvPr>
@@ -5565,7 +5152,7 @@
             <p:cNvPr id="15" name="TextBox 14">
               <a:extLst>
                 <a:ext uri="{FF2B5EF4-FFF2-40B4-BE49-F238E27FC236}">
-                  <a16:creationId xmlns="" xmlns:a16="http://schemas.microsoft.com/office/drawing/2014/main" id="{589E7152-499C-44E8-BA29-4777970B8AAA}"/>
+                  <a16:creationId xmlns:a16="http://schemas.microsoft.com/office/drawing/2014/main" xmlns="" id="{589E7152-499C-44E8-BA29-4777970B8AAA}"/>
                 </a:ext>
               </a:extLst>
             </p:cNvPr>
@@ -6177,7 +5764,7 @@
             <p:cNvPr id="39" name="TextBox 38">
               <a:extLst>
                 <a:ext uri="{FF2B5EF4-FFF2-40B4-BE49-F238E27FC236}">
-                  <a16:creationId xmlns="" xmlns:a16="http://schemas.microsoft.com/office/drawing/2014/main" id="{036694F8-822A-4EA9-A83F-BB11CF14A3AC}"/>
+                  <a16:creationId xmlns:a16="http://schemas.microsoft.com/office/drawing/2014/main" xmlns="" id="{036694F8-822A-4EA9-A83F-BB11CF14A3AC}"/>
                 </a:ext>
               </a:extLst>
             </p:cNvPr>
@@ -6572,7 +6159,7 @@
           <p:cNvPr id="44" name="TextBox 43">
             <a:extLst>
               <a:ext uri="{FF2B5EF4-FFF2-40B4-BE49-F238E27FC236}">
-                <a16:creationId xmlns="" xmlns:a16="http://schemas.microsoft.com/office/drawing/2014/main" id="{036694F8-822A-4EA9-A83F-BB11CF14A3AC}"/>
+                <a16:creationId xmlns:a16="http://schemas.microsoft.com/office/drawing/2014/main" xmlns="" id="{036694F8-822A-4EA9-A83F-BB11CF14A3AC}"/>
               </a:ext>
             </a:extLst>
           </p:cNvPr>
@@ -6611,7 +6198,7 @@
         </p:nvGrpSpPr>
         <p:grpSpPr>
           <a:xfrm>
-            <a:off x="12186698" y="6561310"/>
+            <a:off x="12657512" y="6575672"/>
             <a:ext cx="2162972" cy="4668355"/>
             <a:chOff x="5401041" y="6615028"/>
             <a:chExt cx="2162972" cy="4668355"/>
@@ -6622,7 +6209,7 @@
             <p:cNvPr id="38" name="TextBox 37">
               <a:extLst>
                 <a:ext uri="{FF2B5EF4-FFF2-40B4-BE49-F238E27FC236}">
-                  <a16:creationId xmlns="" xmlns:a16="http://schemas.microsoft.com/office/drawing/2014/main" id="{036694F8-822A-4EA9-A83F-BB11CF14A3AC}"/>
+                  <a16:creationId xmlns:a16="http://schemas.microsoft.com/office/drawing/2014/main" xmlns="" id="{036694F8-822A-4EA9-A83F-BB11CF14A3AC}"/>
                 </a:ext>
               </a:extLst>
             </p:cNvPr>
@@ -6686,7 +6273,7 @@
                 <p:cNvPr id="82" name="Picture 81">
                   <a:extLst>
                     <a:ext uri="{FF2B5EF4-FFF2-40B4-BE49-F238E27FC236}">
-                      <a16:creationId xmlns="" xmlns:a16="http://schemas.microsoft.com/office/drawing/2014/main" id="{4DEA67FD-D5A0-4C43-AE8C-3FD531A15958}"/>
+                      <a16:creationId xmlns:a16="http://schemas.microsoft.com/office/drawing/2014/main" xmlns="" id="{4DEA67FD-D5A0-4C43-AE8C-3FD531A15958}"/>
                     </a:ext>
                   </a:extLst>
                 </p:cNvPr>
@@ -7064,7 +6651,7 @@
           <p:cNvPr id="77" name="TextBox 76">
             <a:extLst>
               <a:ext uri="{FF2B5EF4-FFF2-40B4-BE49-F238E27FC236}">
-                <a16:creationId xmlns="" xmlns:a16="http://schemas.microsoft.com/office/drawing/2014/main" id="{036694F8-822A-4EA9-A83F-BB11CF14A3AC}"/>
+                <a16:creationId xmlns:a16="http://schemas.microsoft.com/office/drawing/2014/main" xmlns="" id="{036694F8-822A-4EA9-A83F-BB11CF14A3AC}"/>
               </a:ext>
             </a:extLst>
           </p:cNvPr>
@@ -7100,7 +6687,7 @@
           <p:cNvPr id="78" name="TextBox 77">
             <a:extLst>
               <a:ext uri="{FF2B5EF4-FFF2-40B4-BE49-F238E27FC236}">
-                <a16:creationId xmlns="" xmlns:a16="http://schemas.microsoft.com/office/drawing/2014/main" id="{036694F8-822A-4EA9-A83F-BB11CF14A3AC}"/>
+                <a16:creationId xmlns:a16="http://schemas.microsoft.com/office/drawing/2014/main" xmlns="" id="{036694F8-822A-4EA9-A83F-BB11CF14A3AC}"/>
               </a:ext>
             </a:extLst>
           </p:cNvPr>
@@ -7128,6 +6715,77 @@
               <a:t>d</a:t>
             </a:r>
             <a:endParaRPr lang="en-AU" sz="1200" dirty="0"/>
+          </a:p>
+        </p:txBody>
+      </p:sp>
+      <p:cxnSp>
+        <p:nvCxnSpPr>
+          <p:cNvPr id="17" name="Straight Arrow Connector 16"/>
+          <p:cNvCxnSpPr/>
+          <p:nvPr/>
+        </p:nvCxnSpPr>
+        <p:spPr>
+          <a:xfrm flipH="1">
+            <a:off x="9031065" y="4239848"/>
+            <a:ext cx="1197456" cy="438478"/>
+          </a:xfrm>
+          <a:prstGeom prst="straightConnector1">
+            <a:avLst/>
+          </a:prstGeom>
+          <a:ln>
+            <a:tailEnd type="triangle"/>
+          </a:ln>
+        </p:spPr>
+        <p:style>
+          <a:lnRef idx="1">
+            <a:schemeClr val="accent1"/>
+          </a:lnRef>
+          <a:fillRef idx="0">
+            <a:schemeClr val="accent1"/>
+          </a:fillRef>
+          <a:effectRef idx="0">
+            <a:schemeClr val="accent1"/>
+          </a:effectRef>
+          <a:fontRef idx="minor">
+            <a:schemeClr val="tx1"/>
+          </a:fontRef>
+        </p:style>
+      </p:cxnSp>
+      <p:sp>
+        <p:nvSpPr>
+          <p:cNvPr id="18" name="TextBox 17"/>
+          <p:cNvSpPr txBox="1"/>
+          <p:nvPr/>
+        </p:nvSpPr>
+        <p:spPr>
+          <a:xfrm>
+            <a:off x="10398642" y="4103816"/>
+            <a:ext cx="1318437" cy="646331"/>
+          </a:xfrm>
+          <a:prstGeom prst="rect">
+            <a:avLst/>
+          </a:prstGeom>
+          <a:noFill/>
+        </p:spPr>
+        <p:txBody>
+          <a:bodyPr wrap="square" rtlCol="0">
+            <a:spAutoFit/>
+          </a:bodyPr>
+          <a:lstStyle/>
+          <a:p>
+            <a:r>
+              <a:rPr lang="en-AU" dirty="0" smtClean="0"/>
+              <a:t>Re: </a:t>
+            </a:r>
+            <a:r>
+              <a:rPr lang="en-AU" dirty="0" err="1" smtClean="0"/>
+              <a:t>Ghimire</a:t>
+            </a:r>
+            <a:r>
+              <a:rPr lang="en-AU" dirty="0" smtClean="0"/>
+              <a:t> hypothesis</a:t>
+            </a:r>
+            <a:endParaRPr lang="en-AU" dirty="0"/>
           </a:p>
         </p:txBody>
       </p:sp>

</xml_diff>